<commit_message>
final version week two
</commit_message>
<xml_diff>
--- a/Coroutine.pptx
+++ b/Coroutine.pptx
@@ -107,6 +107,11 @@
       </a:defRPr>
     </a:lvl9pPr>
   </p:defaultTextStyle>
+  <p:extLst>
+    <p:ext uri="{EFAFB233-063F-42B5-8137-9DF3F51BA10A}">
+      <p15:sldGuideLst xmlns:p15="http://schemas.microsoft.com/office/powerpoint/2012/main"/>
+    </p:ext>
+  </p:extLst>
 </p:presentation>
 </file>
 
@@ -257,7 +262,7 @@
           <a:p>
             <a:fld id="{4D9A7A60-0F96-4BCA-8140-99C8B4C957AC}" type="datetimeFigureOut">
               <a:rPr lang="zh-TW" altLang="en-US" smtClean="0"/>
-              <a:t>2019/1/18</a:t>
+              <a:t>2019/1/21</a:t>
             </a:fld>
             <a:endParaRPr lang="zh-TW" altLang="en-US"/>
           </a:p>
@@ -455,7 +460,7 @@
           <a:p>
             <a:fld id="{4D9A7A60-0F96-4BCA-8140-99C8B4C957AC}" type="datetimeFigureOut">
               <a:rPr lang="zh-TW" altLang="en-US" smtClean="0"/>
-              <a:t>2019/1/18</a:t>
+              <a:t>2019/1/21</a:t>
             </a:fld>
             <a:endParaRPr lang="zh-TW" altLang="en-US"/>
           </a:p>
@@ -663,7 +668,7 @@
           <a:p>
             <a:fld id="{4D9A7A60-0F96-4BCA-8140-99C8B4C957AC}" type="datetimeFigureOut">
               <a:rPr lang="zh-TW" altLang="en-US" smtClean="0"/>
-              <a:t>2019/1/18</a:t>
+              <a:t>2019/1/21</a:t>
             </a:fld>
             <a:endParaRPr lang="zh-TW" altLang="en-US"/>
           </a:p>
@@ -861,7 +866,7 @@
           <a:p>
             <a:fld id="{4D9A7A60-0F96-4BCA-8140-99C8B4C957AC}" type="datetimeFigureOut">
               <a:rPr lang="zh-TW" altLang="en-US" smtClean="0"/>
-              <a:t>2019/1/18</a:t>
+              <a:t>2019/1/21</a:t>
             </a:fld>
             <a:endParaRPr lang="zh-TW" altLang="en-US"/>
           </a:p>
@@ -1136,7 +1141,7 @@
           <a:p>
             <a:fld id="{4D9A7A60-0F96-4BCA-8140-99C8B4C957AC}" type="datetimeFigureOut">
               <a:rPr lang="zh-TW" altLang="en-US" smtClean="0"/>
-              <a:t>2019/1/18</a:t>
+              <a:t>2019/1/21</a:t>
             </a:fld>
             <a:endParaRPr lang="zh-TW" altLang="en-US"/>
           </a:p>
@@ -1401,7 +1406,7 @@
           <a:p>
             <a:fld id="{4D9A7A60-0F96-4BCA-8140-99C8B4C957AC}" type="datetimeFigureOut">
               <a:rPr lang="zh-TW" altLang="en-US" smtClean="0"/>
-              <a:t>2019/1/18</a:t>
+              <a:t>2019/1/21</a:t>
             </a:fld>
             <a:endParaRPr lang="zh-TW" altLang="en-US"/>
           </a:p>
@@ -1813,7 +1818,7 @@
           <a:p>
             <a:fld id="{4D9A7A60-0F96-4BCA-8140-99C8B4C957AC}" type="datetimeFigureOut">
               <a:rPr lang="zh-TW" altLang="en-US" smtClean="0"/>
-              <a:t>2019/1/18</a:t>
+              <a:t>2019/1/21</a:t>
             </a:fld>
             <a:endParaRPr lang="zh-TW" altLang="en-US"/>
           </a:p>
@@ -1954,7 +1959,7 @@
           <a:p>
             <a:fld id="{4D9A7A60-0F96-4BCA-8140-99C8B4C957AC}" type="datetimeFigureOut">
               <a:rPr lang="zh-TW" altLang="en-US" smtClean="0"/>
-              <a:t>2019/1/18</a:t>
+              <a:t>2019/1/21</a:t>
             </a:fld>
             <a:endParaRPr lang="zh-TW" altLang="en-US"/>
           </a:p>
@@ -2067,7 +2072,7 @@
           <a:p>
             <a:fld id="{4D9A7A60-0F96-4BCA-8140-99C8B4C957AC}" type="datetimeFigureOut">
               <a:rPr lang="zh-TW" altLang="en-US" smtClean="0"/>
-              <a:t>2019/1/18</a:t>
+              <a:t>2019/1/21</a:t>
             </a:fld>
             <a:endParaRPr lang="zh-TW" altLang="en-US"/>
           </a:p>
@@ -2378,7 +2383,7 @@
           <a:p>
             <a:fld id="{4D9A7A60-0F96-4BCA-8140-99C8B4C957AC}" type="datetimeFigureOut">
               <a:rPr lang="zh-TW" altLang="en-US" smtClean="0"/>
-              <a:t>2019/1/18</a:t>
+              <a:t>2019/1/21</a:t>
             </a:fld>
             <a:endParaRPr lang="zh-TW" altLang="en-US"/>
           </a:p>
@@ -2666,7 +2671,7 @@
           <a:p>
             <a:fld id="{4D9A7A60-0F96-4BCA-8140-99C8B4C957AC}" type="datetimeFigureOut">
               <a:rPr lang="zh-TW" altLang="en-US" smtClean="0"/>
-              <a:t>2019/1/18</a:t>
+              <a:t>2019/1/21</a:t>
             </a:fld>
             <a:endParaRPr lang="zh-TW" altLang="en-US"/>
           </a:p>
@@ -2907,7 +2912,7 @@
           <a:p>
             <a:fld id="{4D9A7A60-0F96-4BCA-8140-99C8B4C957AC}" type="datetimeFigureOut">
               <a:rPr lang="zh-TW" altLang="en-US" smtClean="0"/>
-              <a:t>2019/1/18</a:t>
+              <a:t>2019/1/21</a:t>
             </a:fld>
             <a:endParaRPr lang="zh-TW" altLang="en-US"/>
           </a:p>
@@ -5960,868 +5965,6 @@
           </p:txBody>
         </p:sp>
       </p:grpSp>
-      <p:grpSp>
-        <p:nvGrpSpPr>
-          <p:cNvPr id="23" name="群組 22">
-            <a:extLst>
-              <a:ext uri="{FF2B5EF4-FFF2-40B4-BE49-F238E27FC236}">
-                <a16:creationId xmlns:a16="http://schemas.microsoft.com/office/drawing/2014/main" id="{58E0A89F-7BAE-436F-AA74-812D11091851}"/>
-              </a:ext>
-            </a:extLst>
-          </p:cNvPr>
-          <p:cNvGrpSpPr/>
-          <p:nvPr/>
-        </p:nvGrpSpPr>
-        <p:grpSpPr>
-          <a:xfrm>
-            <a:off x="5518980" y="1335952"/>
-            <a:ext cx="3960000" cy="2340000"/>
-            <a:chOff x="2669060" y="901628"/>
-            <a:chExt cx="5942046" cy="5165540"/>
-          </a:xfrm>
-        </p:grpSpPr>
-        <p:cxnSp>
-          <p:nvCxnSpPr>
-            <p:cNvPr id="24" name="直線接點 23">
-              <a:extLst>
-                <a:ext uri="{FF2B5EF4-FFF2-40B4-BE49-F238E27FC236}">
-                  <a16:creationId xmlns:a16="http://schemas.microsoft.com/office/drawing/2014/main" id="{C899FAEE-035C-4AF8-BBF8-ED56BA14C9EA}"/>
-                </a:ext>
-              </a:extLst>
-            </p:cNvPr>
-            <p:cNvCxnSpPr/>
-            <p:nvPr/>
-          </p:nvCxnSpPr>
-          <p:spPr>
-            <a:xfrm>
-              <a:off x="2669060" y="1367481"/>
-              <a:ext cx="5824151" cy="0"/>
-            </a:xfrm>
-            <a:prstGeom prst="line">
-              <a:avLst/>
-            </a:prstGeom>
-            <a:ln w="15875">
-              <a:solidFill>
-                <a:schemeClr val="tx1"/>
-              </a:solidFill>
-            </a:ln>
-          </p:spPr>
-          <p:style>
-            <a:lnRef idx="1">
-              <a:schemeClr val="accent1"/>
-            </a:lnRef>
-            <a:fillRef idx="0">
-              <a:schemeClr val="accent1"/>
-            </a:fillRef>
-            <a:effectRef idx="0">
-              <a:schemeClr val="accent1"/>
-            </a:effectRef>
-            <a:fontRef idx="minor">
-              <a:schemeClr val="tx1"/>
-            </a:fontRef>
-          </p:style>
-        </p:cxnSp>
-        <p:cxnSp>
-          <p:nvCxnSpPr>
-            <p:cNvPr id="25" name="直線接點 24">
-              <a:extLst>
-                <a:ext uri="{FF2B5EF4-FFF2-40B4-BE49-F238E27FC236}">
-                  <a16:creationId xmlns:a16="http://schemas.microsoft.com/office/drawing/2014/main" id="{DAC316DE-6BC6-49E3-8426-1B46346D2786}"/>
-                </a:ext>
-              </a:extLst>
-            </p:cNvPr>
-            <p:cNvCxnSpPr>
-              <a:cxnSpLocks/>
-            </p:cNvCxnSpPr>
-            <p:nvPr/>
-          </p:nvCxnSpPr>
-          <p:spPr>
-            <a:xfrm>
-              <a:off x="3480487" y="1367481"/>
-              <a:ext cx="0" cy="4699687"/>
-            </a:xfrm>
-            <a:prstGeom prst="line">
-              <a:avLst/>
-            </a:prstGeom>
-            <a:ln w="15875">
-              <a:solidFill>
-                <a:schemeClr val="tx1"/>
-              </a:solidFill>
-            </a:ln>
-          </p:spPr>
-          <p:style>
-            <a:lnRef idx="1">
-              <a:schemeClr val="accent1"/>
-            </a:lnRef>
-            <a:fillRef idx="0">
-              <a:schemeClr val="accent1"/>
-            </a:fillRef>
-            <a:effectRef idx="0">
-              <a:schemeClr val="accent1"/>
-            </a:effectRef>
-            <a:fontRef idx="minor">
-              <a:schemeClr val="tx1"/>
-            </a:fontRef>
-          </p:style>
-        </p:cxnSp>
-        <p:cxnSp>
-          <p:nvCxnSpPr>
-            <p:cNvPr id="26" name="直線接點 25">
-              <a:extLst>
-                <a:ext uri="{FF2B5EF4-FFF2-40B4-BE49-F238E27FC236}">
-                  <a16:creationId xmlns:a16="http://schemas.microsoft.com/office/drawing/2014/main" id="{DB31A16A-41D0-47CA-9650-77B613AFBA3B}"/>
-                </a:ext>
-              </a:extLst>
-            </p:cNvPr>
-            <p:cNvCxnSpPr>
-              <a:cxnSpLocks/>
-            </p:cNvCxnSpPr>
-            <p:nvPr/>
-          </p:nvCxnSpPr>
-          <p:spPr>
-            <a:xfrm>
-              <a:off x="5807680" y="1367481"/>
-              <a:ext cx="0" cy="4699687"/>
-            </a:xfrm>
-            <a:prstGeom prst="line">
-              <a:avLst/>
-            </a:prstGeom>
-            <a:ln w="15875">
-              <a:solidFill>
-                <a:schemeClr val="tx1"/>
-              </a:solidFill>
-            </a:ln>
-          </p:spPr>
-          <p:style>
-            <a:lnRef idx="1">
-              <a:schemeClr val="accent1"/>
-            </a:lnRef>
-            <a:fillRef idx="0">
-              <a:schemeClr val="accent1"/>
-            </a:fillRef>
-            <a:effectRef idx="0">
-              <a:schemeClr val="accent1"/>
-            </a:effectRef>
-            <a:fontRef idx="minor">
-              <a:schemeClr val="tx1"/>
-            </a:fontRef>
-          </p:style>
-        </p:cxnSp>
-        <p:cxnSp>
-          <p:nvCxnSpPr>
-            <p:cNvPr id="27" name="直線接點 26">
-              <a:extLst>
-                <a:ext uri="{FF2B5EF4-FFF2-40B4-BE49-F238E27FC236}">
-                  <a16:creationId xmlns:a16="http://schemas.microsoft.com/office/drawing/2014/main" id="{C0A22077-B579-4A1E-87B6-3977C0BBA6E1}"/>
-                </a:ext>
-              </a:extLst>
-            </p:cNvPr>
-            <p:cNvCxnSpPr>
-              <a:cxnSpLocks/>
-            </p:cNvCxnSpPr>
-            <p:nvPr/>
-          </p:nvCxnSpPr>
-          <p:spPr>
-            <a:xfrm>
-              <a:off x="8110152" y="1367481"/>
-              <a:ext cx="0" cy="4699687"/>
-            </a:xfrm>
-            <a:prstGeom prst="line">
-              <a:avLst/>
-            </a:prstGeom>
-            <a:ln w="15875">
-              <a:solidFill>
-                <a:schemeClr val="tx1"/>
-              </a:solidFill>
-            </a:ln>
-          </p:spPr>
-          <p:style>
-            <a:lnRef idx="1">
-              <a:schemeClr val="accent1"/>
-            </a:lnRef>
-            <a:fillRef idx="0">
-              <a:schemeClr val="accent1"/>
-            </a:fillRef>
-            <a:effectRef idx="0">
-              <a:schemeClr val="accent1"/>
-            </a:effectRef>
-            <a:fontRef idx="minor">
-              <a:schemeClr val="tx1"/>
-            </a:fontRef>
-          </p:style>
-        </p:cxnSp>
-        <p:sp>
-          <p:nvSpPr>
-            <p:cNvPr id="28" name="矩形 27">
-              <a:extLst>
-                <a:ext uri="{FF2B5EF4-FFF2-40B4-BE49-F238E27FC236}">
-                  <a16:creationId xmlns:a16="http://schemas.microsoft.com/office/drawing/2014/main" id="{AFC39090-CEBD-4DE5-A8B9-1C4172D93F93}"/>
-                </a:ext>
-              </a:extLst>
-            </p:cNvPr>
-            <p:cNvSpPr/>
-            <p:nvPr/>
-          </p:nvSpPr>
-          <p:spPr>
-            <a:xfrm>
-              <a:off x="3307493" y="1367480"/>
-              <a:ext cx="345988" cy="4250723"/>
-            </a:xfrm>
-            <a:prstGeom prst="rect">
-              <a:avLst/>
-            </a:prstGeom>
-            <a:solidFill>
-              <a:schemeClr val="tx1">
-                <a:lumMod val="50000"/>
-                <a:lumOff val="50000"/>
-              </a:schemeClr>
-            </a:solidFill>
-            <a:ln>
-              <a:solidFill>
-                <a:schemeClr val="tx1">
-                  <a:lumMod val="50000"/>
-                  <a:lumOff val="50000"/>
-                </a:schemeClr>
-              </a:solidFill>
-            </a:ln>
-          </p:spPr>
-          <p:style>
-            <a:lnRef idx="2">
-              <a:schemeClr val="accent1">
-                <a:shade val="50000"/>
-              </a:schemeClr>
-            </a:lnRef>
-            <a:fillRef idx="1">
-              <a:schemeClr val="accent1"/>
-            </a:fillRef>
-            <a:effectRef idx="0">
-              <a:schemeClr val="accent1"/>
-            </a:effectRef>
-            <a:fontRef idx="minor">
-              <a:schemeClr val="lt1"/>
-            </a:fontRef>
-          </p:style>
-          <p:txBody>
-            <a:bodyPr rtlCol="0" anchor="ctr"/>
-            <a:lstStyle/>
-            <a:p>
-              <a:pPr algn="ctr"/>
-              <a:endParaRPr lang="zh-TW" altLang="en-US" sz="1000" dirty="0"/>
-            </a:p>
-          </p:txBody>
-        </p:sp>
-        <p:sp>
-          <p:nvSpPr>
-            <p:cNvPr id="29" name="矩形 28">
-              <a:extLst>
-                <a:ext uri="{FF2B5EF4-FFF2-40B4-BE49-F238E27FC236}">
-                  <a16:creationId xmlns:a16="http://schemas.microsoft.com/office/drawing/2014/main" id="{A483302F-35E0-44CC-A219-EA99172C90CF}"/>
-                </a:ext>
-              </a:extLst>
-            </p:cNvPr>
-            <p:cNvSpPr/>
-            <p:nvPr/>
-          </p:nvSpPr>
-          <p:spPr>
-            <a:xfrm>
-              <a:off x="5651159" y="1795848"/>
-              <a:ext cx="345988" cy="3352791"/>
-            </a:xfrm>
-            <a:prstGeom prst="rect">
-              <a:avLst/>
-            </a:prstGeom>
-            <a:solidFill>
-              <a:schemeClr val="tx1">
-                <a:lumMod val="50000"/>
-                <a:lumOff val="50000"/>
-              </a:schemeClr>
-            </a:solidFill>
-            <a:ln>
-              <a:solidFill>
-                <a:schemeClr val="tx1">
-                  <a:lumMod val="50000"/>
-                  <a:lumOff val="50000"/>
-                </a:schemeClr>
-              </a:solidFill>
-            </a:ln>
-          </p:spPr>
-          <p:style>
-            <a:lnRef idx="2">
-              <a:schemeClr val="accent1">
-                <a:shade val="50000"/>
-              </a:schemeClr>
-            </a:lnRef>
-            <a:fillRef idx="1">
-              <a:schemeClr val="accent1"/>
-            </a:fillRef>
-            <a:effectRef idx="0">
-              <a:schemeClr val="accent1"/>
-            </a:effectRef>
-            <a:fontRef idx="minor">
-              <a:schemeClr val="lt1"/>
-            </a:fontRef>
-          </p:style>
-          <p:txBody>
-            <a:bodyPr rot="0" spcFirstLastPara="0" vertOverflow="overflow" horzOverflow="overflow" vert="horz" wrap="square" lIns="91440" tIns="45720" rIns="91440" bIns="45720" numCol="1" spcCol="0" rtlCol="0" fromWordArt="0" anchor="ctr" anchorCtr="0" forceAA="0" compatLnSpc="1">
-              <a:prstTxWarp prst="textNoShape">
-                <a:avLst/>
-              </a:prstTxWarp>
-              <a:noAutofit/>
-            </a:bodyPr>
-            <a:lstStyle/>
-            <a:p>
-              <a:pPr algn="ctr"/>
-              <a:endParaRPr lang="zh-TW" altLang="en-US" sz="1000"/>
-            </a:p>
-          </p:txBody>
-        </p:sp>
-        <p:sp>
-          <p:nvSpPr>
-            <p:cNvPr id="30" name="矩形 29">
-              <a:extLst>
-                <a:ext uri="{FF2B5EF4-FFF2-40B4-BE49-F238E27FC236}">
-                  <a16:creationId xmlns:a16="http://schemas.microsoft.com/office/drawing/2014/main" id="{BA39CF17-A380-4BE9-B18A-6D3825030E2A}"/>
-                </a:ext>
-              </a:extLst>
-            </p:cNvPr>
-            <p:cNvSpPr/>
-            <p:nvPr/>
-          </p:nvSpPr>
-          <p:spPr>
-            <a:xfrm>
-              <a:off x="7937158" y="2640227"/>
-              <a:ext cx="345988" cy="1861752"/>
-            </a:xfrm>
-            <a:prstGeom prst="rect">
-              <a:avLst/>
-            </a:prstGeom>
-            <a:solidFill>
-              <a:schemeClr val="tx1">
-                <a:lumMod val="50000"/>
-                <a:lumOff val="50000"/>
-              </a:schemeClr>
-            </a:solidFill>
-            <a:ln>
-              <a:solidFill>
-                <a:schemeClr val="tx1">
-                  <a:lumMod val="50000"/>
-                  <a:lumOff val="50000"/>
-                </a:schemeClr>
-              </a:solidFill>
-            </a:ln>
-          </p:spPr>
-          <p:style>
-            <a:lnRef idx="2">
-              <a:schemeClr val="accent1">
-                <a:shade val="50000"/>
-              </a:schemeClr>
-            </a:lnRef>
-            <a:fillRef idx="1">
-              <a:schemeClr val="accent1"/>
-            </a:fillRef>
-            <a:effectRef idx="0">
-              <a:schemeClr val="accent1"/>
-            </a:effectRef>
-            <a:fontRef idx="minor">
-              <a:schemeClr val="lt1"/>
-            </a:fontRef>
-          </p:style>
-          <p:txBody>
-            <a:bodyPr rot="0" spcFirstLastPara="0" vertOverflow="overflow" horzOverflow="overflow" vert="horz" wrap="square" lIns="91440" tIns="45720" rIns="91440" bIns="45720" numCol="1" spcCol="0" rtlCol="0" fromWordArt="0" anchor="ctr" anchorCtr="0" forceAA="0" compatLnSpc="1">
-              <a:prstTxWarp prst="textNoShape">
-                <a:avLst/>
-              </a:prstTxWarp>
-              <a:noAutofit/>
-            </a:bodyPr>
-            <a:lstStyle/>
-            <a:p>
-              <a:pPr algn="ctr"/>
-              <a:endParaRPr lang="zh-TW" altLang="en-US" sz="1000"/>
-            </a:p>
-          </p:txBody>
-        </p:sp>
-        <p:cxnSp>
-          <p:nvCxnSpPr>
-            <p:cNvPr id="31" name="直線單箭頭接點 30">
-              <a:extLst>
-                <a:ext uri="{FF2B5EF4-FFF2-40B4-BE49-F238E27FC236}">
-                  <a16:creationId xmlns:a16="http://schemas.microsoft.com/office/drawing/2014/main" id="{7F936D69-89FB-4256-BBE8-3F493829C52B}"/>
-                </a:ext>
-              </a:extLst>
-            </p:cNvPr>
-            <p:cNvCxnSpPr>
-              <a:cxnSpLocks/>
-            </p:cNvCxnSpPr>
-            <p:nvPr/>
-          </p:nvCxnSpPr>
-          <p:spPr>
-            <a:xfrm>
-              <a:off x="3653481" y="1993557"/>
-              <a:ext cx="1997678" cy="0"/>
-            </a:xfrm>
-            <a:prstGeom prst="straightConnector1">
-              <a:avLst/>
-            </a:prstGeom>
-            <a:ln w="15875">
-              <a:solidFill>
-                <a:schemeClr val="accent4">
-                  <a:lumMod val="60000"/>
-                  <a:lumOff val="40000"/>
-                </a:schemeClr>
-              </a:solidFill>
-              <a:tailEnd type="triangle"/>
-            </a:ln>
-          </p:spPr>
-          <p:style>
-            <a:lnRef idx="1">
-              <a:schemeClr val="accent1"/>
-            </a:lnRef>
-            <a:fillRef idx="0">
-              <a:schemeClr val="accent1"/>
-            </a:fillRef>
-            <a:effectRef idx="0">
-              <a:schemeClr val="accent1"/>
-            </a:effectRef>
-            <a:fontRef idx="minor">
-              <a:schemeClr val="tx1"/>
-            </a:fontRef>
-          </p:style>
-        </p:cxnSp>
-        <p:cxnSp>
-          <p:nvCxnSpPr>
-            <p:cNvPr id="32" name="直線單箭頭接點 31">
-              <a:extLst>
-                <a:ext uri="{FF2B5EF4-FFF2-40B4-BE49-F238E27FC236}">
-                  <a16:creationId xmlns:a16="http://schemas.microsoft.com/office/drawing/2014/main" id="{F1C17E69-C161-45E7-8851-0DB5808C183A}"/>
-                </a:ext>
-              </a:extLst>
-            </p:cNvPr>
-            <p:cNvCxnSpPr>
-              <a:cxnSpLocks/>
-            </p:cNvCxnSpPr>
-            <p:nvPr/>
-          </p:nvCxnSpPr>
-          <p:spPr>
-            <a:xfrm>
-              <a:off x="5997147" y="2745914"/>
-              <a:ext cx="1940011" cy="0"/>
-            </a:xfrm>
-            <a:prstGeom prst="straightConnector1">
-              <a:avLst/>
-            </a:prstGeom>
-            <a:ln w="15875">
-              <a:tailEnd type="triangle"/>
-            </a:ln>
-          </p:spPr>
-          <p:style>
-            <a:lnRef idx="1">
-              <a:schemeClr val="accent1"/>
-            </a:lnRef>
-            <a:fillRef idx="0">
-              <a:schemeClr val="accent1"/>
-            </a:fillRef>
-            <a:effectRef idx="0">
-              <a:schemeClr val="accent1"/>
-            </a:effectRef>
-            <a:fontRef idx="minor">
-              <a:schemeClr val="tx1"/>
-            </a:fontRef>
-          </p:style>
-        </p:cxnSp>
-        <p:cxnSp>
-          <p:nvCxnSpPr>
-            <p:cNvPr id="33" name="直線單箭頭接點 32">
-              <a:extLst>
-                <a:ext uri="{FF2B5EF4-FFF2-40B4-BE49-F238E27FC236}">
-                  <a16:creationId xmlns:a16="http://schemas.microsoft.com/office/drawing/2014/main" id="{16CFBF51-EE6E-408F-81CD-ED7754CF08F9}"/>
-                </a:ext>
-              </a:extLst>
-            </p:cNvPr>
-            <p:cNvCxnSpPr>
-              <a:cxnSpLocks/>
-            </p:cNvCxnSpPr>
-            <p:nvPr/>
-          </p:nvCxnSpPr>
-          <p:spPr>
-            <a:xfrm>
-              <a:off x="3653481" y="3440432"/>
-              <a:ext cx="4283677" cy="27430"/>
-            </a:xfrm>
-            <a:prstGeom prst="straightConnector1">
-              <a:avLst/>
-            </a:prstGeom>
-            <a:ln w="15875">
-              <a:solidFill>
-                <a:schemeClr val="accent6">
-                  <a:lumMod val="50000"/>
-                </a:schemeClr>
-              </a:solidFill>
-              <a:headEnd type="triangle"/>
-              <a:tailEnd type="none"/>
-            </a:ln>
-          </p:spPr>
-          <p:style>
-            <a:lnRef idx="1">
-              <a:schemeClr val="accent1"/>
-            </a:lnRef>
-            <a:fillRef idx="0">
-              <a:schemeClr val="accent1"/>
-            </a:fillRef>
-            <a:effectRef idx="0">
-              <a:schemeClr val="accent1"/>
-            </a:effectRef>
-            <a:fontRef idx="minor">
-              <a:schemeClr val="tx1"/>
-            </a:fontRef>
-          </p:style>
-        </p:cxnSp>
-        <p:cxnSp>
-          <p:nvCxnSpPr>
-            <p:cNvPr id="34" name="直線單箭頭接點 17">
-              <a:extLst>
-                <a:ext uri="{FF2B5EF4-FFF2-40B4-BE49-F238E27FC236}">
-                  <a16:creationId xmlns:a16="http://schemas.microsoft.com/office/drawing/2014/main" id="{DA8295AF-1A96-455C-A852-3E4312263B23}"/>
-                </a:ext>
-              </a:extLst>
-            </p:cNvPr>
-            <p:cNvCxnSpPr>
-              <a:cxnSpLocks/>
-            </p:cNvCxnSpPr>
-            <p:nvPr/>
-          </p:nvCxnSpPr>
-          <p:spPr>
-            <a:xfrm rot="10800000">
-              <a:off x="5990967" y="2851603"/>
-              <a:ext cx="1958553" cy="1570167"/>
-            </a:xfrm>
-            <a:prstGeom prst="bentConnector3">
-              <a:avLst>
-                <a:gd name="adj1" fmla="val 50000"/>
-              </a:avLst>
-            </a:prstGeom>
-            <a:ln w="15875" cap="rnd" cmpd="sng" algn="ctr">
-              <a:solidFill>
-                <a:srgbClr val="FF0000"/>
-              </a:solidFill>
-              <a:prstDash val="dash"/>
-              <a:round/>
-              <a:headEnd type="none" w="med" len="med"/>
-              <a:tailEnd type="triangle" w="med" len="med"/>
-            </a:ln>
-          </p:spPr>
-          <p:style>
-            <a:lnRef idx="0">
-              <a:scrgbClr r="0" g="0" b="0"/>
-            </a:lnRef>
-            <a:fillRef idx="0">
-              <a:scrgbClr r="0" g="0" b="0"/>
-            </a:fillRef>
-            <a:effectRef idx="0">
-              <a:scrgbClr r="0" g="0" b="0"/>
-            </a:effectRef>
-            <a:fontRef idx="minor">
-              <a:schemeClr val="tx1"/>
-            </a:fontRef>
-          </p:style>
-        </p:cxnSp>
-        <p:cxnSp>
-          <p:nvCxnSpPr>
-            <p:cNvPr id="35" name="直線單箭頭接點 34">
-              <a:extLst>
-                <a:ext uri="{FF2B5EF4-FFF2-40B4-BE49-F238E27FC236}">
-                  <a16:creationId xmlns:a16="http://schemas.microsoft.com/office/drawing/2014/main" id="{63E1CEF3-C253-465B-A1E3-5BE9917E05BC}"/>
-                </a:ext>
-              </a:extLst>
-            </p:cNvPr>
-            <p:cNvCxnSpPr>
-              <a:cxnSpLocks/>
-            </p:cNvCxnSpPr>
-            <p:nvPr/>
-          </p:nvCxnSpPr>
-          <p:spPr>
-            <a:xfrm>
-              <a:off x="2669060" y="1542842"/>
-              <a:ext cx="638433" cy="0"/>
-            </a:xfrm>
-            <a:prstGeom prst="straightConnector1">
-              <a:avLst/>
-            </a:prstGeom>
-            <a:ln w="15875">
-              <a:solidFill>
-                <a:schemeClr val="accent5">
-                  <a:lumMod val="75000"/>
-                </a:schemeClr>
-              </a:solidFill>
-              <a:tailEnd type="triangle"/>
-            </a:ln>
-          </p:spPr>
-          <p:style>
-            <a:lnRef idx="1">
-              <a:schemeClr val="accent1"/>
-            </a:lnRef>
-            <a:fillRef idx="0">
-              <a:schemeClr val="accent1"/>
-            </a:fillRef>
-            <a:effectRef idx="0">
-              <a:schemeClr val="accent1"/>
-            </a:effectRef>
-            <a:fontRef idx="minor">
-              <a:schemeClr val="tx1"/>
-            </a:fontRef>
-          </p:style>
-        </p:cxnSp>
-        <p:cxnSp>
-          <p:nvCxnSpPr>
-            <p:cNvPr id="36" name="直線單箭頭接點 17">
-              <a:extLst>
-                <a:ext uri="{FF2B5EF4-FFF2-40B4-BE49-F238E27FC236}">
-                  <a16:creationId xmlns:a16="http://schemas.microsoft.com/office/drawing/2014/main" id="{54C0EF39-CA57-4317-952A-03678A5619F5}"/>
-                </a:ext>
-              </a:extLst>
-            </p:cNvPr>
-            <p:cNvCxnSpPr>
-              <a:cxnSpLocks/>
-            </p:cNvCxnSpPr>
-            <p:nvPr/>
-          </p:nvCxnSpPr>
-          <p:spPr>
-            <a:xfrm flipH="1" flipV="1">
-              <a:off x="2754521" y="5490519"/>
-              <a:ext cx="552974" cy="2"/>
-            </a:xfrm>
-            <a:prstGeom prst="straightConnector1">
-              <a:avLst/>
-            </a:prstGeom>
-            <a:ln w="15875" cap="rnd" cmpd="sng" algn="ctr">
-              <a:solidFill>
-                <a:srgbClr val="FF0000"/>
-              </a:solidFill>
-              <a:prstDash val="dash"/>
-              <a:round/>
-              <a:headEnd type="none" w="med" len="med"/>
-              <a:tailEnd type="triangle" w="med" len="med"/>
-            </a:ln>
-          </p:spPr>
-          <p:style>
-            <a:lnRef idx="0">
-              <a:scrgbClr r="0" g="0" b="0"/>
-            </a:lnRef>
-            <a:fillRef idx="0">
-              <a:scrgbClr r="0" g="0" b="0"/>
-            </a:fillRef>
-            <a:effectRef idx="0">
-              <a:scrgbClr r="0" g="0" b="0"/>
-            </a:effectRef>
-            <a:fontRef idx="minor">
-              <a:schemeClr val="tx1"/>
-            </a:fontRef>
-          </p:style>
-        </p:cxnSp>
-        <p:sp>
-          <p:nvSpPr>
-            <p:cNvPr id="37" name="文字方塊 36">
-              <a:extLst>
-                <a:ext uri="{FF2B5EF4-FFF2-40B4-BE49-F238E27FC236}">
-                  <a16:creationId xmlns:a16="http://schemas.microsoft.com/office/drawing/2014/main" id="{0DA10BD2-98FE-4B74-B956-EE8FD2E7F7B4}"/>
-                </a:ext>
-              </a:extLst>
-            </p:cNvPr>
-            <p:cNvSpPr txBox="1"/>
-            <p:nvPr/>
-          </p:nvSpPr>
-          <p:spPr>
-            <a:xfrm>
-              <a:off x="2765768" y="907621"/>
-              <a:ext cx="1429437" cy="543532"/>
-            </a:xfrm>
-            <a:prstGeom prst="rect">
-              <a:avLst/>
-            </a:prstGeom>
-            <a:noFill/>
-          </p:spPr>
-          <p:txBody>
-            <a:bodyPr wrap="square" rtlCol="0">
-              <a:spAutoFit/>
-            </a:bodyPr>
-            <a:lstStyle/>
-            <a:p>
-              <a:r>
-                <a:rPr lang="en-US" altLang="zh-TW" sz="1000" dirty="0"/>
-                <a:t>Main Thread</a:t>
-              </a:r>
-              <a:endParaRPr lang="zh-TW" altLang="en-US" sz="1000" dirty="0"/>
-            </a:p>
-          </p:txBody>
-        </p:sp>
-        <p:sp>
-          <p:nvSpPr>
-            <p:cNvPr id="38" name="文字方塊 37">
-              <a:extLst>
-                <a:ext uri="{FF2B5EF4-FFF2-40B4-BE49-F238E27FC236}">
-                  <a16:creationId xmlns:a16="http://schemas.microsoft.com/office/drawing/2014/main" id="{D5EF6DF7-E265-4087-8CD5-5238AD3F641B}"/>
-                </a:ext>
-              </a:extLst>
-            </p:cNvPr>
-            <p:cNvSpPr txBox="1"/>
-            <p:nvPr/>
-          </p:nvSpPr>
-          <p:spPr>
-            <a:xfrm>
-              <a:off x="5369606" y="911681"/>
-              <a:ext cx="851425" cy="543532"/>
-            </a:xfrm>
-            <a:prstGeom prst="rect">
-              <a:avLst/>
-            </a:prstGeom>
-            <a:noFill/>
-          </p:spPr>
-          <p:txBody>
-            <a:bodyPr wrap="square" rtlCol="0">
-              <a:spAutoFit/>
-            </a:bodyPr>
-            <a:lstStyle/>
-            <a:p>
-              <a:r>
-                <a:rPr lang="en-US" altLang="zh-TW" sz="1000" dirty="0"/>
-                <a:t>Thread</a:t>
-              </a:r>
-              <a:endParaRPr lang="zh-TW" altLang="en-US" sz="1000" dirty="0"/>
-            </a:p>
-          </p:txBody>
-        </p:sp>
-        <p:sp>
-          <p:nvSpPr>
-            <p:cNvPr id="39" name="文字方塊 38">
-              <a:extLst>
-                <a:ext uri="{FF2B5EF4-FFF2-40B4-BE49-F238E27FC236}">
-                  <a16:creationId xmlns:a16="http://schemas.microsoft.com/office/drawing/2014/main" id="{6D13C616-2EAA-421F-B759-C90B0C650161}"/>
-                </a:ext>
-              </a:extLst>
-            </p:cNvPr>
-            <p:cNvSpPr txBox="1"/>
-            <p:nvPr/>
-          </p:nvSpPr>
-          <p:spPr>
-            <a:xfrm>
-              <a:off x="7609198" y="901628"/>
-              <a:ext cx="1001908" cy="543532"/>
-            </a:xfrm>
-            <a:prstGeom prst="rect">
-              <a:avLst/>
-            </a:prstGeom>
-            <a:noFill/>
-          </p:spPr>
-          <p:txBody>
-            <a:bodyPr wrap="square" rtlCol="0">
-              <a:spAutoFit/>
-            </a:bodyPr>
-            <a:lstStyle/>
-            <a:p>
-              <a:r>
-                <a:rPr lang="en-US" altLang="zh-TW" sz="1000" dirty="0"/>
-                <a:t>Function</a:t>
-              </a:r>
-              <a:endParaRPr lang="zh-TW" altLang="en-US" sz="1000" dirty="0"/>
-            </a:p>
-          </p:txBody>
-        </p:sp>
-        <p:sp>
-          <p:nvSpPr>
-            <p:cNvPr id="40" name="文字方塊 39">
-              <a:extLst>
-                <a:ext uri="{FF2B5EF4-FFF2-40B4-BE49-F238E27FC236}">
-                  <a16:creationId xmlns:a16="http://schemas.microsoft.com/office/drawing/2014/main" id="{C2BC5574-3BA1-4E6D-9A5B-C2B280BEB5A0}"/>
-                </a:ext>
-              </a:extLst>
-            </p:cNvPr>
-            <p:cNvSpPr txBox="1"/>
-            <p:nvPr/>
-          </p:nvSpPr>
-          <p:spPr>
-            <a:xfrm>
-              <a:off x="7230274" y="3082563"/>
-              <a:ext cx="743955" cy="475592"/>
-            </a:xfrm>
-            <a:prstGeom prst="rect">
-              <a:avLst/>
-            </a:prstGeom>
-            <a:noFill/>
-          </p:spPr>
-          <p:txBody>
-            <a:bodyPr wrap="square" rtlCol="0">
-              <a:spAutoFit/>
-            </a:bodyPr>
-            <a:lstStyle/>
-            <a:p>
-              <a:r>
-                <a:rPr lang="en-US" altLang="zh-TW" sz="800" b="1" dirty="0">
-                  <a:solidFill>
-                    <a:schemeClr val="accent4">
-                      <a:lumMod val="50000"/>
-                    </a:schemeClr>
-                  </a:solidFill>
-                </a:rPr>
-                <a:t>Signal</a:t>
-              </a:r>
-              <a:endParaRPr lang="zh-TW" altLang="en-US" sz="800" b="1" dirty="0">
-                <a:solidFill>
-                  <a:schemeClr val="accent4">
-                    <a:lumMod val="50000"/>
-                  </a:schemeClr>
-                </a:solidFill>
-              </a:endParaRPr>
-            </a:p>
-          </p:txBody>
-        </p:sp>
-        <p:sp>
-          <p:nvSpPr>
-            <p:cNvPr id="41" name="文字方塊 40">
-              <a:extLst>
-                <a:ext uri="{FF2B5EF4-FFF2-40B4-BE49-F238E27FC236}">
-                  <a16:creationId xmlns:a16="http://schemas.microsoft.com/office/drawing/2014/main" id="{C142C765-B80B-4B34-807B-418A6CF43916}"/>
-                </a:ext>
-              </a:extLst>
-            </p:cNvPr>
-            <p:cNvSpPr txBox="1"/>
-            <p:nvPr/>
-          </p:nvSpPr>
-          <p:spPr>
-            <a:xfrm>
-              <a:off x="3644547" y="1574071"/>
-              <a:ext cx="647357" cy="543532"/>
-            </a:xfrm>
-            <a:prstGeom prst="rect">
-              <a:avLst/>
-            </a:prstGeom>
-            <a:noFill/>
-          </p:spPr>
-          <p:txBody>
-            <a:bodyPr wrap="square" rtlCol="0">
-              <a:spAutoFit/>
-            </a:bodyPr>
-            <a:lstStyle/>
-            <a:p>
-              <a:r>
-                <a:rPr lang="en-US" altLang="zh-TW" sz="1000" b="1" dirty="0">
-                  <a:solidFill>
-                    <a:schemeClr val="accent4">
-                      <a:lumMod val="50000"/>
-                    </a:schemeClr>
-                  </a:solidFill>
-                </a:rPr>
-                <a:t>Fork</a:t>
-              </a:r>
-              <a:endParaRPr lang="zh-TW" altLang="en-US" sz="1000" b="1" dirty="0">
-                <a:solidFill>
-                  <a:schemeClr val="accent4">
-                    <a:lumMod val="50000"/>
-                  </a:schemeClr>
-                </a:solidFill>
-              </a:endParaRPr>
-            </a:p>
-          </p:txBody>
-        </p:sp>
-      </p:grpSp>
       <p:sp>
         <p:nvSpPr>
           <p:cNvPr id="42" name="文字方塊 41">
@@ -6891,6 +6034,965 @@
               <a:t>Multithread</a:t>
             </a:r>
             <a:endParaRPr lang="zh-TW" altLang="en-US" dirty="0"/>
+          </a:p>
+        </p:txBody>
+      </p:sp>
+      <p:grpSp>
+        <p:nvGrpSpPr>
+          <p:cNvPr id="44" name="群組 43">
+            <a:extLst>
+              <a:ext uri="{FF2B5EF4-FFF2-40B4-BE49-F238E27FC236}">
+                <a16:creationId xmlns:a16="http://schemas.microsoft.com/office/drawing/2014/main" id="{0C2F31F7-38E4-4F06-8713-44BA5436F796}"/>
+              </a:ext>
+            </a:extLst>
+          </p:cNvPr>
+          <p:cNvGrpSpPr/>
+          <p:nvPr/>
+        </p:nvGrpSpPr>
+        <p:grpSpPr>
+          <a:xfrm>
+            <a:off x="5470064" y="1335952"/>
+            <a:ext cx="3960000" cy="2340000"/>
+            <a:chOff x="2669060" y="901628"/>
+            <a:chExt cx="5942046" cy="5165540"/>
+          </a:xfrm>
+        </p:grpSpPr>
+        <p:cxnSp>
+          <p:nvCxnSpPr>
+            <p:cNvPr id="45" name="直線接點 44">
+              <a:extLst>
+                <a:ext uri="{FF2B5EF4-FFF2-40B4-BE49-F238E27FC236}">
+                  <a16:creationId xmlns:a16="http://schemas.microsoft.com/office/drawing/2014/main" id="{B283929A-8FBD-44A0-BC86-8891288DE17C}"/>
+                </a:ext>
+              </a:extLst>
+            </p:cNvPr>
+            <p:cNvCxnSpPr/>
+            <p:nvPr/>
+          </p:nvCxnSpPr>
+          <p:spPr>
+            <a:xfrm>
+              <a:off x="2669060" y="1367481"/>
+              <a:ext cx="5824151" cy="0"/>
+            </a:xfrm>
+            <a:prstGeom prst="line">
+              <a:avLst/>
+            </a:prstGeom>
+            <a:ln w="15875">
+              <a:solidFill>
+                <a:schemeClr val="tx1"/>
+              </a:solidFill>
+            </a:ln>
+          </p:spPr>
+          <p:style>
+            <a:lnRef idx="1">
+              <a:schemeClr val="accent1"/>
+            </a:lnRef>
+            <a:fillRef idx="0">
+              <a:schemeClr val="accent1"/>
+            </a:fillRef>
+            <a:effectRef idx="0">
+              <a:schemeClr val="accent1"/>
+            </a:effectRef>
+            <a:fontRef idx="minor">
+              <a:schemeClr val="tx1"/>
+            </a:fontRef>
+          </p:style>
+        </p:cxnSp>
+        <p:cxnSp>
+          <p:nvCxnSpPr>
+            <p:cNvPr id="46" name="直線接點 45">
+              <a:extLst>
+                <a:ext uri="{FF2B5EF4-FFF2-40B4-BE49-F238E27FC236}">
+                  <a16:creationId xmlns:a16="http://schemas.microsoft.com/office/drawing/2014/main" id="{EBF28183-ECC1-46AC-AF7E-5CF8B9DB4426}"/>
+                </a:ext>
+              </a:extLst>
+            </p:cNvPr>
+            <p:cNvCxnSpPr>
+              <a:cxnSpLocks/>
+            </p:cNvCxnSpPr>
+            <p:nvPr/>
+          </p:nvCxnSpPr>
+          <p:spPr>
+            <a:xfrm>
+              <a:off x="3480487" y="1367481"/>
+              <a:ext cx="0" cy="4699687"/>
+            </a:xfrm>
+            <a:prstGeom prst="line">
+              <a:avLst/>
+            </a:prstGeom>
+            <a:ln w="15875">
+              <a:solidFill>
+                <a:schemeClr val="tx1"/>
+              </a:solidFill>
+            </a:ln>
+          </p:spPr>
+          <p:style>
+            <a:lnRef idx="1">
+              <a:schemeClr val="accent1"/>
+            </a:lnRef>
+            <a:fillRef idx="0">
+              <a:schemeClr val="accent1"/>
+            </a:fillRef>
+            <a:effectRef idx="0">
+              <a:schemeClr val="accent1"/>
+            </a:effectRef>
+            <a:fontRef idx="minor">
+              <a:schemeClr val="tx1"/>
+            </a:fontRef>
+          </p:style>
+        </p:cxnSp>
+        <p:cxnSp>
+          <p:nvCxnSpPr>
+            <p:cNvPr id="47" name="直線接點 46">
+              <a:extLst>
+                <a:ext uri="{FF2B5EF4-FFF2-40B4-BE49-F238E27FC236}">
+                  <a16:creationId xmlns:a16="http://schemas.microsoft.com/office/drawing/2014/main" id="{1C3735C4-E9A6-474F-A3C8-783C16C5BAD1}"/>
+                </a:ext>
+              </a:extLst>
+            </p:cNvPr>
+            <p:cNvCxnSpPr>
+              <a:cxnSpLocks/>
+            </p:cNvCxnSpPr>
+            <p:nvPr/>
+          </p:nvCxnSpPr>
+          <p:spPr>
+            <a:xfrm>
+              <a:off x="5807680" y="1367481"/>
+              <a:ext cx="0" cy="4699687"/>
+            </a:xfrm>
+            <a:prstGeom prst="line">
+              <a:avLst/>
+            </a:prstGeom>
+            <a:ln w="15875">
+              <a:solidFill>
+                <a:schemeClr val="tx1"/>
+              </a:solidFill>
+            </a:ln>
+          </p:spPr>
+          <p:style>
+            <a:lnRef idx="1">
+              <a:schemeClr val="accent1"/>
+            </a:lnRef>
+            <a:fillRef idx="0">
+              <a:schemeClr val="accent1"/>
+            </a:fillRef>
+            <a:effectRef idx="0">
+              <a:schemeClr val="accent1"/>
+            </a:effectRef>
+            <a:fontRef idx="minor">
+              <a:schemeClr val="tx1"/>
+            </a:fontRef>
+          </p:style>
+        </p:cxnSp>
+        <p:cxnSp>
+          <p:nvCxnSpPr>
+            <p:cNvPr id="48" name="直線接點 47">
+              <a:extLst>
+                <a:ext uri="{FF2B5EF4-FFF2-40B4-BE49-F238E27FC236}">
+                  <a16:creationId xmlns:a16="http://schemas.microsoft.com/office/drawing/2014/main" id="{B64EBEEB-2052-46D5-99F5-D0E6A814AC68}"/>
+                </a:ext>
+              </a:extLst>
+            </p:cNvPr>
+            <p:cNvCxnSpPr>
+              <a:cxnSpLocks/>
+            </p:cNvCxnSpPr>
+            <p:nvPr/>
+          </p:nvCxnSpPr>
+          <p:spPr>
+            <a:xfrm>
+              <a:off x="8110152" y="1367481"/>
+              <a:ext cx="0" cy="4699687"/>
+            </a:xfrm>
+            <a:prstGeom prst="line">
+              <a:avLst/>
+            </a:prstGeom>
+            <a:ln w="15875">
+              <a:solidFill>
+                <a:schemeClr val="tx1"/>
+              </a:solidFill>
+            </a:ln>
+          </p:spPr>
+          <p:style>
+            <a:lnRef idx="1">
+              <a:schemeClr val="accent1"/>
+            </a:lnRef>
+            <a:fillRef idx="0">
+              <a:schemeClr val="accent1"/>
+            </a:fillRef>
+            <a:effectRef idx="0">
+              <a:schemeClr val="accent1"/>
+            </a:effectRef>
+            <a:fontRef idx="minor">
+              <a:schemeClr val="tx1"/>
+            </a:fontRef>
+          </p:style>
+        </p:cxnSp>
+        <p:sp>
+          <p:nvSpPr>
+            <p:cNvPr id="49" name="矩形 48">
+              <a:extLst>
+                <a:ext uri="{FF2B5EF4-FFF2-40B4-BE49-F238E27FC236}">
+                  <a16:creationId xmlns:a16="http://schemas.microsoft.com/office/drawing/2014/main" id="{D17101BA-0D06-491A-8E07-567202A0D2FA}"/>
+                </a:ext>
+              </a:extLst>
+            </p:cNvPr>
+            <p:cNvSpPr/>
+            <p:nvPr/>
+          </p:nvSpPr>
+          <p:spPr>
+            <a:xfrm>
+              <a:off x="3307493" y="1367480"/>
+              <a:ext cx="345988" cy="4250723"/>
+            </a:xfrm>
+            <a:prstGeom prst="rect">
+              <a:avLst/>
+            </a:prstGeom>
+            <a:solidFill>
+              <a:schemeClr val="tx1">
+                <a:lumMod val="50000"/>
+                <a:lumOff val="50000"/>
+              </a:schemeClr>
+            </a:solidFill>
+            <a:ln>
+              <a:solidFill>
+                <a:schemeClr val="tx1">
+                  <a:lumMod val="50000"/>
+                  <a:lumOff val="50000"/>
+                </a:schemeClr>
+              </a:solidFill>
+            </a:ln>
+          </p:spPr>
+          <p:style>
+            <a:lnRef idx="2">
+              <a:schemeClr val="accent1">
+                <a:shade val="50000"/>
+              </a:schemeClr>
+            </a:lnRef>
+            <a:fillRef idx="1">
+              <a:schemeClr val="accent1"/>
+            </a:fillRef>
+            <a:effectRef idx="0">
+              <a:schemeClr val="accent1"/>
+            </a:effectRef>
+            <a:fontRef idx="minor">
+              <a:schemeClr val="lt1"/>
+            </a:fontRef>
+          </p:style>
+          <p:txBody>
+            <a:bodyPr rtlCol="0" anchor="ctr"/>
+            <a:lstStyle/>
+            <a:p>
+              <a:pPr algn="ctr"/>
+              <a:endParaRPr lang="zh-TW" altLang="en-US" sz="1000" dirty="0"/>
+            </a:p>
+          </p:txBody>
+        </p:sp>
+        <p:sp>
+          <p:nvSpPr>
+            <p:cNvPr id="50" name="矩形 49">
+              <a:extLst>
+                <a:ext uri="{FF2B5EF4-FFF2-40B4-BE49-F238E27FC236}">
+                  <a16:creationId xmlns:a16="http://schemas.microsoft.com/office/drawing/2014/main" id="{5B5BF271-3BB1-4F0C-B52E-422A5C30B502}"/>
+                </a:ext>
+              </a:extLst>
+            </p:cNvPr>
+            <p:cNvSpPr/>
+            <p:nvPr/>
+          </p:nvSpPr>
+          <p:spPr>
+            <a:xfrm>
+              <a:off x="5651159" y="1795848"/>
+              <a:ext cx="345988" cy="3352791"/>
+            </a:xfrm>
+            <a:prstGeom prst="rect">
+              <a:avLst/>
+            </a:prstGeom>
+            <a:solidFill>
+              <a:schemeClr val="tx1">
+                <a:lumMod val="50000"/>
+                <a:lumOff val="50000"/>
+              </a:schemeClr>
+            </a:solidFill>
+            <a:ln>
+              <a:solidFill>
+                <a:schemeClr val="tx1">
+                  <a:lumMod val="50000"/>
+                  <a:lumOff val="50000"/>
+                </a:schemeClr>
+              </a:solidFill>
+            </a:ln>
+          </p:spPr>
+          <p:style>
+            <a:lnRef idx="2">
+              <a:schemeClr val="accent1">
+                <a:shade val="50000"/>
+              </a:schemeClr>
+            </a:lnRef>
+            <a:fillRef idx="1">
+              <a:schemeClr val="accent1"/>
+            </a:fillRef>
+            <a:effectRef idx="0">
+              <a:schemeClr val="accent1"/>
+            </a:effectRef>
+            <a:fontRef idx="minor">
+              <a:schemeClr val="lt1"/>
+            </a:fontRef>
+          </p:style>
+          <p:txBody>
+            <a:bodyPr rot="0" spcFirstLastPara="0" vertOverflow="overflow" horzOverflow="overflow" vert="horz" wrap="square" lIns="91440" tIns="45720" rIns="91440" bIns="45720" numCol="1" spcCol="0" rtlCol="0" fromWordArt="0" anchor="ctr" anchorCtr="0" forceAA="0" compatLnSpc="1">
+              <a:prstTxWarp prst="textNoShape">
+                <a:avLst/>
+              </a:prstTxWarp>
+              <a:noAutofit/>
+            </a:bodyPr>
+            <a:lstStyle/>
+            <a:p>
+              <a:pPr algn="ctr"/>
+              <a:endParaRPr lang="zh-TW" altLang="en-US" sz="1000"/>
+            </a:p>
+          </p:txBody>
+        </p:sp>
+        <p:sp>
+          <p:nvSpPr>
+            <p:cNvPr id="51" name="矩形 50">
+              <a:extLst>
+                <a:ext uri="{FF2B5EF4-FFF2-40B4-BE49-F238E27FC236}">
+                  <a16:creationId xmlns:a16="http://schemas.microsoft.com/office/drawing/2014/main" id="{7217C422-8F33-405E-8C64-1E627A2C8AD8}"/>
+                </a:ext>
+              </a:extLst>
+            </p:cNvPr>
+            <p:cNvSpPr/>
+            <p:nvPr/>
+          </p:nvSpPr>
+          <p:spPr>
+            <a:xfrm>
+              <a:off x="7937158" y="2640227"/>
+              <a:ext cx="345988" cy="1861752"/>
+            </a:xfrm>
+            <a:prstGeom prst="rect">
+              <a:avLst/>
+            </a:prstGeom>
+            <a:solidFill>
+              <a:schemeClr val="tx1">
+                <a:lumMod val="50000"/>
+                <a:lumOff val="50000"/>
+              </a:schemeClr>
+            </a:solidFill>
+            <a:ln>
+              <a:solidFill>
+                <a:schemeClr val="tx1">
+                  <a:lumMod val="50000"/>
+                  <a:lumOff val="50000"/>
+                </a:schemeClr>
+              </a:solidFill>
+            </a:ln>
+          </p:spPr>
+          <p:style>
+            <a:lnRef idx="2">
+              <a:schemeClr val="accent1">
+                <a:shade val="50000"/>
+              </a:schemeClr>
+            </a:lnRef>
+            <a:fillRef idx="1">
+              <a:schemeClr val="accent1"/>
+            </a:fillRef>
+            <a:effectRef idx="0">
+              <a:schemeClr val="accent1"/>
+            </a:effectRef>
+            <a:fontRef idx="minor">
+              <a:schemeClr val="lt1"/>
+            </a:fontRef>
+          </p:style>
+          <p:txBody>
+            <a:bodyPr rot="0" spcFirstLastPara="0" vertOverflow="overflow" horzOverflow="overflow" vert="horz" wrap="square" lIns="91440" tIns="45720" rIns="91440" bIns="45720" numCol="1" spcCol="0" rtlCol="0" fromWordArt="0" anchor="ctr" anchorCtr="0" forceAA="0" compatLnSpc="1">
+              <a:prstTxWarp prst="textNoShape">
+                <a:avLst/>
+              </a:prstTxWarp>
+              <a:noAutofit/>
+            </a:bodyPr>
+            <a:lstStyle/>
+            <a:p>
+              <a:pPr algn="ctr"/>
+              <a:endParaRPr lang="zh-TW" altLang="en-US" sz="1000"/>
+            </a:p>
+          </p:txBody>
+        </p:sp>
+        <p:cxnSp>
+          <p:nvCxnSpPr>
+            <p:cNvPr id="52" name="直線單箭頭接點 51">
+              <a:extLst>
+                <a:ext uri="{FF2B5EF4-FFF2-40B4-BE49-F238E27FC236}">
+                  <a16:creationId xmlns:a16="http://schemas.microsoft.com/office/drawing/2014/main" id="{DD45B8CF-CB0A-4B4E-817F-56094D3AD7B6}"/>
+                </a:ext>
+              </a:extLst>
+            </p:cNvPr>
+            <p:cNvCxnSpPr>
+              <a:cxnSpLocks/>
+            </p:cNvCxnSpPr>
+            <p:nvPr/>
+          </p:nvCxnSpPr>
+          <p:spPr>
+            <a:xfrm>
+              <a:off x="3653481" y="1993557"/>
+              <a:ext cx="1997678" cy="0"/>
+            </a:xfrm>
+            <a:prstGeom prst="straightConnector1">
+              <a:avLst/>
+            </a:prstGeom>
+            <a:ln w="15875">
+              <a:solidFill>
+                <a:schemeClr val="accent4">
+                  <a:lumMod val="60000"/>
+                  <a:lumOff val="40000"/>
+                </a:schemeClr>
+              </a:solidFill>
+              <a:tailEnd type="triangle"/>
+            </a:ln>
+          </p:spPr>
+          <p:style>
+            <a:lnRef idx="1">
+              <a:schemeClr val="accent1"/>
+            </a:lnRef>
+            <a:fillRef idx="0">
+              <a:schemeClr val="accent1"/>
+            </a:fillRef>
+            <a:effectRef idx="0">
+              <a:schemeClr val="accent1"/>
+            </a:effectRef>
+            <a:fontRef idx="minor">
+              <a:schemeClr val="tx1"/>
+            </a:fontRef>
+          </p:style>
+        </p:cxnSp>
+        <p:cxnSp>
+          <p:nvCxnSpPr>
+            <p:cNvPr id="53" name="直線單箭頭接點 52">
+              <a:extLst>
+                <a:ext uri="{FF2B5EF4-FFF2-40B4-BE49-F238E27FC236}">
+                  <a16:creationId xmlns:a16="http://schemas.microsoft.com/office/drawing/2014/main" id="{D5112E2C-44DC-4AD9-90C6-495D9D45A0E8}"/>
+                </a:ext>
+              </a:extLst>
+            </p:cNvPr>
+            <p:cNvCxnSpPr>
+              <a:cxnSpLocks/>
+            </p:cNvCxnSpPr>
+            <p:nvPr/>
+          </p:nvCxnSpPr>
+          <p:spPr>
+            <a:xfrm>
+              <a:off x="5997147" y="2745914"/>
+              <a:ext cx="1940011" cy="0"/>
+            </a:xfrm>
+            <a:prstGeom prst="straightConnector1">
+              <a:avLst/>
+            </a:prstGeom>
+            <a:ln w="15875">
+              <a:tailEnd type="triangle"/>
+            </a:ln>
+          </p:spPr>
+          <p:style>
+            <a:lnRef idx="1">
+              <a:schemeClr val="accent1"/>
+            </a:lnRef>
+            <a:fillRef idx="0">
+              <a:schemeClr val="accent1"/>
+            </a:fillRef>
+            <a:effectRef idx="0">
+              <a:schemeClr val="accent1"/>
+            </a:effectRef>
+            <a:fontRef idx="minor">
+              <a:schemeClr val="tx1"/>
+            </a:fontRef>
+          </p:style>
+        </p:cxnSp>
+        <p:cxnSp>
+          <p:nvCxnSpPr>
+            <p:cNvPr id="54" name="直線單箭頭接點 53">
+              <a:extLst>
+                <a:ext uri="{FF2B5EF4-FFF2-40B4-BE49-F238E27FC236}">
+                  <a16:creationId xmlns:a16="http://schemas.microsoft.com/office/drawing/2014/main" id="{C1F4A139-EB1F-406B-AE0C-D4BFB5B6024D}"/>
+                </a:ext>
+              </a:extLst>
+            </p:cNvPr>
+            <p:cNvCxnSpPr>
+              <a:cxnSpLocks/>
+            </p:cNvCxnSpPr>
+            <p:nvPr/>
+          </p:nvCxnSpPr>
+          <p:spPr>
+            <a:xfrm>
+              <a:off x="3653481" y="3440432"/>
+              <a:ext cx="4283677" cy="27430"/>
+            </a:xfrm>
+            <a:prstGeom prst="straightConnector1">
+              <a:avLst/>
+            </a:prstGeom>
+            <a:ln w="15875">
+              <a:solidFill>
+                <a:schemeClr val="accent6">
+                  <a:lumMod val="50000"/>
+                </a:schemeClr>
+              </a:solidFill>
+              <a:headEnd type="none"/>
+              <a:tailEnd type="triangle"/>
+            </a:ln>
+          </p:spPr>
+          <p:style>
+            <a:lnRef idx="1">
+              <a:schemeClr val="accent1"/>
+            </a:lnRef>
+            <a:fillRef idx="0">
+              <a:schemeClr val="accent1"/>
+            </a:fillRef>
+            <a:effectRef idx="0">
+              <a:schemeClr val="accent1"/>
+            </a:effectRef>
+            <a:fontRef idx="minor">
+              <a:schemeClr val="tx1"/>
+            </a:fontRef>
+          </p:style>
+        </p:cxnSp>
+        <p:cxnSp>
+          <p:nvCxnSpPr>
+            <p:cNvPr id="55" name="直線單箭頭接點 17">
+              <a:extLst>
+                <a:ext uri="{FF2B5EF4-FFF2-40B4-BE49-F238E27FC236}">
+                  <a16:creationId xmlns:a16="http://schemas.microsoft.com/office/drawing/2014/main" id="{8FDA482C-500B-4000-8E88-BFF20DB1FD6E}"/>
+                </a:ext>
+              </a:extLst>
+            </p:cNvPr>
+            <p:cNvCxnSpPr>
+              <a:cxnSpLocks/>
+            </p:cNvCxnSpPr>
+            <p:nvPr/>
+          </p:nvCxnSpPr>
+          <p:spPr>
+            <a:xfrm rot="10800000">
+              <a:off x="5990967" y="2851603"/>
+              <a:ext cx="1958553" cy="1570167"/>
+            </a:xfrm>
+            <a:prstGeom prst="bentConnector3">
+              <a:avLst>
+                <a:gd name="adj1" fmla="val 50000"/>
+              </a:avLst>
+            </a:prstGeom>
+            <a:ln w="15875" cap="rnd" cmpd="sng" algn="ctr">
+              <a:solidFill>
+                <a:srgbClr val="FF0000"/>
+              </a:solidFill>
+              <a:prstDash val="dash"/>
+              <a:round/>
+              <a:headEnd type="none" w="med" len="med"/>
+              <a:tailEnd type="triangle" w="med" len="med"/>
+            </a:ln>
+          </p:spPr>
+          <p:style>
+            <a:lnRef idx="0">
+              <a:scrgbClr r="0" g="0" b="0"/>
+            </a:lnRef>
+            <a:fillRef idx="0">
+              <a:scrgbClr r="0" g="0" b="0"/>
+            </a:fillRef>
+            <a:effectRef idx="0">
+              <a:scrgbClr r="0" g="0" b="0"/>
+            </a:effectRef>
+            <a:fontRef idx="minor">
+              <a:schemeClr val="tx1"/>
+            </a:fontRef>
+          </p:style>
+        </p:cxnSp>
+        <p:cxnSp>
+          <p:nvCxnSpPr>
+            <p:cNvPr id="56" name="直線單箭頭接點 55">
+              <a:extLst>
+                <a:ext uri="{FF2B5EF4-FFF2-40B4-BE49-F238E27FC236}">
+                  <a16:creationId xmlns:a16="http://schemas.microsoft.com/office/drawing/2014/main" id="{C394212F-E423-40F2-B70D-11DAF5F1F4B9}"/>
+                </a:ext>
+              </a:extLst>
+            </p:cNvPr>
+            <p:cNvCxnSpPr>
+              <a:cxnSpLocks/>
+            </p:cNvCxnSpPr>
+            <p:nvPr/>
+          </p:nvCxnSpPr>
+          <p:spPr>
+            <a:xfrm>
+              <a:off x="2669060" y="1542842"/>
+              <a:ext cx="638433" cy="0"/>
+            </a:xfrm>
+            <a:prstGeom prst="straightConnector1">
+              <a:avLst/>
+            </a:prstGeom>
+            <a:ln w="15875">
+              <a:solidFill>
+                <a:schemeClr val="accent5">
+                  <a:lumMod val="75000"/>
+                </a:schemeClr>
+              </a:solidFill>
+              <a:tailEnd type="triangle"/>
+            </a:ln>
+          </p:spPr>
+          <p:style>
+            <a:lnRef idx="1">
+              <a:schemeClr val="accent1"/>
+            </a:lnRef>
+            <a:fillRef idx="0">
+              <a:schemeClr val="accent1"/>
+            </a:fillRef>
+            <a:effectRef idx="0">
+              <a:schemeClr val="accent1"/>
+            </a:effectRef>
+            <a:fontRef idx="minor">
+              <a:schemeClr val="tx1"/>
+            </a:fontRef>
+          </p:style>
+        </p:cxnSp>
+        <p:cxnSp>
+          <p:nvCxnSpPr>
+            <p:cNvPr id="57" name="直線單箭頭接點 17">
+              <a:extLst>
+                <a:ext uri="{FF2B5EF4-FFF2-40B4-BE49-F238E27FC236}">
+                  <a16:creationId xmlns:a16="http://schemas.microsoft.com/office/drawing/2014/main" id="{2B63F6C2-D62E-4378-84B4-59B37CDBFCC3}"/>
+                </a:ext>
+              </a:extLst>
+            </p:cNvPr>
+            <p:cNvCxnSpPr>
+              <a:cxnSpLocks/>
+            </p:cNvCxnSpPr>
+            <p:nvPr/>
+          </p:nvCxnSpPr>
+          <p:spPr>
+            <a:xfrm flipH="1" flipV="1">
+              <a:off x="2754521" y="5490519"/>
+              <a:ext cx="552974" cy="2"/>
+            </a:xfrm>
+            <a:prstGeom prst="straightConnector1">
+              <a:avLst/>
+            </a:prstGeom>
+            <a:ln w="15875" cap="rnd" cmpd="sng" algn="ctr">
+              <a:solidFill>
+                <a:srgbClr val="FF0000"/>
+              </a:solidFill>
+              <a:prstDash val="dash"/>
+              <a:round/>
+              <a:headEnd type="none" w="med" len="med"/>
+              <a:tailEnd type="triangle" w="med" len="med"/>
+            </a:ln>
+          </p:spPr>
+          <p:style>
+            <a:lnRef idx="0">
+              <a:scrgbClr r="0" g="0" b="0"/>
+            </a:lnRef>
+            <a:fillRef idx="0">
+              <a:scrgbClr r="0" g="0" b="0"/>
+            </a:fillRef>
+            <a:effectRef idx="0">
+              <a:scrgbClr r="0" g="0" b="0"/>
+            </a:effectRef>
+            <a:fontRef idx="minor">
+              <a:schemeClr val="tx1"/>
+            </a:fontRef>
+          </p:style>
+        </p:cxnSp>
+        <p:sp>
+          <p:nvSpPr>
+            <p:cNvPr id="58" name="文字方塊 57">
+              <a:extLst>
+                <a:ext uri="{FF2B5EF4-FFF2-40B4-BE49-F238E27FC236}">
+                  <a16:creationId xmlns:a16="http://schemas.microsoft.com/office/drawing/2014/main" id="{B8F7BB38-7F26-4301-85EA-EA539D9812C4}"/>
+                </a:ext>
+              </a:extLst>
+            </p:cNvPr>
+            <p:cNvSpPr txBox="1"/>
+            <p:nvPr/>
+          </p:nvSpPr>
+          <p:spPr>
+            <a:xfrm>
+              <a:off x="2765768" y="907621"/>
+              <a:ext cx="1429437" cy="543532"/>
+            </a:xfrm>
+            <a:prstGeom prst="rect">
+              <a:avLst/>
+            </a:prstGeom>
+            <a:noFill/>
+          </p:spPr>
+          <p:txBody>
+            <a:bodyPr wrap="square" rtlCol="0">
+              <a:spAutoFit/>
+            </a:bodyPr>
+            <a:lstStyle/>
+            <a:p>
+              <a:r>
+                <a:rPr lang="en-US" altLang="zh-TW" sz="1000" dirty="0"/>
+                <a:t>Main Thread</a:t>
+              </a:r>
+              <a:endParaRPr lang="zh-TW" altLang="en-US" sz="1000" dirty="0"/>
+            </a:p>
+          </p:txBody>
+        </p:sp>
+        <p:sp>
+          <p:nvSpPr>
+            <p:cNvPr id="59" name="文字方塊 58">
+              <a:extLst>
+                <a:ext uri="{FF2B5EF4-FFF2-40B4-BE49-F238E27FC236}">
+                  <a16:creationId xmlns:a16="http://schemas.microsoft.com/office/drawing/2014/main" id="{A377C54A-603E-422D-8EBA-6A894339D0D4}"/>
+                </a:ext>
+              </a:extLst>
+            </p:cNvPr>
+            <p:cNvSpPr txBox="1"/>
+            <p:nvPr/>
+          </p:nvSpPr>
+          <p:spPr>
+            <a:xfrm>
+              <a:off x="5369606" y="911681"/>
+              <a:ext cx="851425" cy="543532"/>
+            </a:xfrm>
+            <a:prstGeom prst="rect">
+              <a:avLst/>
+            </a:prstGeom>
+            <a:noFill/>
+          </p:spPr>
+          <p:txBody>
+            <a:bodyPr wrap="square" rtlCol="0">
+              <a:spAutoFit/>
+            </a:bodyPr>
+            <a:lstStyle/>
+            <a:p>
+              <a:r>
+                <a:rPr lang="en-US" altLang="zh-TW" sz="1000" dirty="0"/>
+                <a:t>Thread</a:t>
+              </a:r>
+              <a:endParaRPr lang="zh-TW" altLang="en-US" sz="1000" dirty="0"/>
+            </a:p>
+          </p:txBody>
+        </p:sp>
+        <p:sp>
+          <p:nvSpPr>
+            <p:cNvPr id="60" name="文字方塊 59">
+              <a:extLst>
+                <a:ext uri="{FF2B5EF4-FFF2-40B4-BE49-F238E27FC236}">
+                  <a16:creationId xmlns:a16="http://schemas.microsoft.com/office/drawing/2014/main" id="{C1278783-2B04-4127-B5EB-BB03E85B44A8}"/>
+                </a:ext>
+              </a:extLst>
+            </p:cNvPr>
+            <p:cNvSpPr txBox="1"/>
+            <p:nvPr/>
+          </p:nvSpPr>
+          <p:spPr>
+            <a:xfrm>
+              <a:off x="7609198" y="901628"/>
+              <a:ext cx="1001908" cy="543532"/>
+            </a:xfrm>
+            <a:prstGeom prst="rect">
+              <a:avLst/>
+            </a:prstGeom>
+            <a:noFill/>
+          </p:spPr>
+          <p:txBody>
+            <a:bodyPr wrap="square" rtlCol="0">
+              <a:spAutoFit/>
+            </a:bodyPr>
+            <a:lstStyle/>
+            <a:p>
+              <a:r>
+                <a:rPr lang="en-US" altLang="zh-TW" sz="1000" dirty="0"/>
+                <a:t>Function</a:t>
+              </a:r>
+              <a:endParaRPr lang="zh-TW" altLang="en-US" sz="1000" dirty="0"/>
+            </a:p>
+          </p:txBody>
+        </p:sp>
+        <p:sp>
+          <p:nvSpPr>
+            <p:cNvPr id="61" name="文字方塊 60">
+              <a:extLst>
+                <a:ext uri="{FF2B5EF4-FFF2-40B4-BE49-F238E27FC236}">
+                  <a16:creationId xmlns:a16="http://schemas.microsoft.com/office/drawing/2014/main" id="{CE2B56D2-8BD5-4B58-BA68-9BA0B1D1426C}"/>
+                </a:ext>
+              </a:extLst>
+            </p:cNvPr>
+            <p:cNvSpPr txBox="1"/>
+            <p:nvPr/>
+          </p:nvSpPr>
+          <p:spPr>
+            <a:xfrm>
+              <a:off x="3609465" y="3036974"/>
+              <a:ext cx="743955" cy="475592"/>
+            </a:xfrm>
+            <a:prstGeom prst="rect">
+              <a:avLst/>
+            </a:prstGeom>
+            <a:noFill/>
+          </p:spPr>
+          <p:txBody>
+            <a:bodyPr wrap="square" rtlCol="0">
+              <a:spAutoFit/>
+            </a:bodyPr>
+            <a:lstStyle/>
+            <a:p>
+              <a:r>
+                <a:rPr lang="en-US" altLang="zh-TW" sz="800" b="1" dirty="0">
+                  <a:solidFill>
+                    <a:schemeClr val="accent4">
+                      <a:lumMod val="50000"/>
+                    </a:schemeClr>
+                  </a:solidFill>
+                </a:rPr>
+                <a:t>Signal</a:t>
+              </a:r>
+              <a:endParaRPr lang="zh-TW" altLang="en-US" sz="800" b="1" dirty="0">
+                <a:solidFill>
+                  <a:schemeClr val="accent4">
+                    <a:lumMod val="50000"/>
+                  </a:schemeClr>
+                </a:solidFill>
+              </a:endParaRPr>
+            </a:p>
+          </p:txBody>
+        </p:sp>
+        <p:sp>
+          <p:nvSpPr>
+            <p:cNvPr id="62" name="文字方塊 61">
+              <a:extLst>
+                <a:ext uri="{FF2B5EF4-FFF2-40B4-BE49-F238E27FC236}">
+                  <a16:creationId xmlns:a16="http://schemas.microsoft.com/office/drawing/2014/main" id="{63829A84-1420-440A-8D85-92BA1C992858}"/>
+                </a:ext>
+              </a:extLst>
+            </p:cNvPr>
+            <p:cNvSpPr txBox="1"/>
+            <p:nvPr/>
+          </p:nvSpPr>
+          <p:spPr>
+            <a:xfrm>
+              <a:off x="3644547" y="1574071"/>
+              <a:ext cx="647357" cy="543532"/>
+            </a:xfrm>
+            <a:prstGeom prst="rect">
+              <a:avLst/>
+            </a:prstGeom>
+            <a:noFill/>
+          </p:spPr>
+          <p:txBody>
+            <a:bodyPr wrap="square" rtlCol="0">
+              <a:spAutoFit/>
+            </a:bodyPr>
+            <a:lstStyle/>
+            <a:p>
+              <a:r>
+                <a:rPr lang="en-US" altLang="zh-TW" sz="1000" b="1" dirty="0">
+                  <a:solidFill>
+                    <a:schemeClr val="accent4">
+                      <a:lumMod val="50000"/>
+                    </a:schemeClr>
+                  </a:solidFill>
+                </a:rPr>
+                <a:t>Fork</a:t>
+              </a:r>
+              <a:endParaRPr lang="zh-TW" altLang="en-US" sz="1000" b="1" dirty="0">
+                <a:solidFill>
+                  <a:schemeClr val="accent4">
+                    <a:lumMod val="50000"/>
+                  </a:schemeClr>
+                </a:solidFill>
+              </a:endParaRPr>
+            </a:p>
+          </p:txBody>
+        </p:sp>
+      </p:grpSp>
+      <p:cxnSp>
+        <p:nvCxnSpPr>
+          <p:cNvPr id="63" name="直線單箭頭接點 22">
+            <a:extLst>
+              <a:ext uri="{FF2B5EF4-FFF2-40B4-BE49-F238E27FC236}">
+                <a16:creationId xmlns:a16="http://schemas.microsoft.com/office/drawing/2014/main" id="{2DC4EC2D-9B1E-42AF-B565-FDD711E34D3C}"/>
+              </a:ext>
+            </a:extLst>
+          </p:cNvPr>
+          <p:cNvCxnSpPr>
+            <a:cxnSpLocks/>
+          </p:cNvCxnSpPr>
+          <p:nvPr/>
+        </p:nvCxnSpPr>
+        <p:spPr>
+          <a:xfrm rot="10800000">
+            <a:off x="3325115" y="2104638"/>
+            <a:ext cx="1331327" cy="648291"/>
+          </a:xfrm>
+          <a:prstGeom prst="bentConnector3">
+            <a:avLst>
+              <a:gd name="adj1" fmla="val 50000"/>
+            </a:avLst>
+          </a:prstGeom>
+          <a:ln w="15875">
+            <a:solidFill>
+              <a:schemeClr val="accent6">
+                <a:lumMod val="50000"/>
+              </a:schemeClr>
+            </a:solidFill>
+            <a:headEnd type="none"/>
+            <a:tailEnd type="triangle"/>
+          </a:ln>
+        </p:spPr>
+        <p:style>
+          <a:lnRef idx="1">
+            <a:schemeClr val="accent1"/>
+          </a:lnRef>
+          <a:fillRef idx="0">
+            <a:schemeClr val="accent1"/>
+          </a:fillRef>
+          <a:effectRef idx="0">
+            <a:schemeClr val="accent1"/>
+          </a:effectRef>
+          <a:fontRef idx="minor">
+            <a:schemeClr val="tx1"/>
+          </a:fontRef>
+        </p:style>
+      </p:cxnSp>
+      <p:sp>
+        <p:nvSpPr>
+          <p:cNvPr id="64" name="文字方塊 63">
+            <a:extLst>
+              <a:ext uri="{FF2B5EF4-FFF2-40B4-BE49-F238E27FC236}">
+                <a16:creationId xmlns:a16="http://schemas.microsoft.com/office/drawing/2014/main" id="{00FDBD7A-C58F-4CDC-89FF-ED4B62C1B2C4}"/>
+              </a:ext>
+            </a:extLst>
+          </p:cNvPr>
+          <p:cNvSpPr txBox="1"/>
+          <p:nvPr/>
+        </p:nvSpPr>
+        <p:spPr>
+          <a:xfrm>
+            <a:off x="4246139" y="2564935"/>
+            <a:ext cx="495799" cy="215444"/>
+          </a:xfrm>
+          <a:prstGeom prst="rect">
+            <a:avLst/>
+          </a:prstGeom>
+          <a:noFill/>
+        </p:spPr>
+        <p:txBody>
+          <a:bodyPr wrap="square" rtlCol="0">
+            <a:spAutoFit/>
+          </a:bodyPr>
+          <a:lstStyle/>
+          <a:p>
+            <a:r>
+              <a:rPr lang="en-US" altLang="zh-TW" sz="800" b="1" dirty="0">
+                <a:solidFill>
+                  <a:schemeClr val="accent4">
+                    <a:lumMod val="50000"/>
+                  </a:schemeClr>
+                </a:solidFill>
+              </a:rPr>
+              <a:t>Signal</a:t>
+            </a:r>
+            <a:endParaRPr lang="zh-TW" altLang="en-US" sz="800" b="1" dirty="0">
+              <a:solidFill>
+                <a:schemeClr val="accent4">
+                  <a:lumMod val="50000"/>
+                </a:schemeClr>
+              </a:solidFill>
+            </a:endParaRPr>
           </a:p>
         </p:txBody>
       </p:sp>
@@ -7420,8 +7522,8 @@
                   <a:lumMod val="50000"/>
                 </a:schemeClr>
               </a:solidFill>
-              <a:headEnd type="triangle"/>
-              <a:tailEnd type="none"/>
+              <a:headEnd type="none"/>
+              <a:tailEnd type="triangle"/>
             </a:ln>
           </p:spPr>
           <p:style>
@@ -7703,7 +7805,7 @@
           </p:nvSpPr>
           <p:spPr>
             <a:xfrm>
-              <a:off x="7230274" y="3082563"/>
+              <a:off x="3609465" y="3036974"/>
               <a:ext cx="743955" cy="475592"/>
             </a:xfrm>
             <a:prstGeom prst="rect">
@@ -7786,6 +7888,103 @@
           </p:txBody>
         </p:sp>
       </p:grpSp>
+      <p:cxnSp>
+        <p:nvCxnSpPr>
+          <p:cNvPr id="23" name="直線單箭頭接點 22">
+            <a:extLst>
+              <a:ext uri="{FF2B5EF4-FFF2-40B4-BE49-F238E27FC236}">
+                <a16:creationId xmlns:a16="http://schemas.microsoft.com/office/drawing/2014/main" id="{295FB9DE-F9D2-4C66-8EB3-4558F1B1DD93}"/>
+              </a:ext>
+            </a:extLst>
+          </p:cNvPr>
+          <p:cNvCxnSpPr>
+            <a:cxnSpLocks/>
+          </p:cNvCxnSpPr>
+          <p:nvPr/>
+        </p:nvCxnSpPr>
+        <p:spPr>
+          <a:xfrm rot="10800000">
+            <a:off x="3325115" y="2104638"/>
+            <a:ext cx="1331327" cy="648291"/>
+          </a:xfrm>
+          <a:prstGeom prst="bentConnector3">
+            <a:avLst>
+              <a:gd name="adj1" fmla="val 50000"/>
+            </a:avLst>
+          </a:prstGeom>
+          <a:ln w="15875">
+            <a:solidFill>
+              <a:schemeClr val="accent6">
+                <a:lumMod val="50000"/>
+              </a:schemeClr>
+            </a:solidFill>
+            <a:headEnd type="none"/>
+            <a:tailEnd type="triangle"/>
+          </a:ln>
+        </p:spPr>
+        <p:style>
+          <a:lnRef idx="1">
+            <a:schemeClr val="accent1"/>
+          </a:lnRef>
+          <a:fillRef idx="0">
+            <a:schemeClr val="accent1"/>
+          </a:fillRef>
+          <a:effectRef idx="0">
+            <a:schemeClr val="accent1"/>
+          </a:effectRef>
+          <a:fontRef idx="minor">
+            <a:schemeClr val="tx1"/>
+          </a:fontRef>
+        </p:style>
+      </p:cxnSp>
+      <p:sp>
+        <p:nvSpPr>
+          <p:cNvPr id="26" name="文字方塊 25">
+            <a:extLst>
+              <a:ext uri="{FF2B5EF4-FFF2-40B4-BE49-F238E27FC236}">
+                <a16:creationId xmlns:a16="http://schemas.microsoft.com/office/drawing/2014/main" id="{3F3DA7A2-5B89-4545-86F2-09DD70A4041F}"/>
+              </a:ext>
+            </a:extLst>
+          </p:cNvPr>
+          <p:cNvSpPr txBox="1"/>
+          <p:nvPr/>
+        </p:nvSpPr>
+        <p:spPr>
+          <a:xfrm>
+            <a:off x="4246139" y="2564935"/>
+            <a:ext cx="495799" cy="215444"/>
+          </a:xfrm>
+          <a:prstGeom prst="rect">
+            <a:avLst/>
+          </a:prstGeom>
+          <a:noFill/>
+        </p:spPr>
+        <p:txBody>
+          <a:bodyPr wrap="square" rtlCol="0">
+            <a:spAutoFit/>
+          </a:bodyPr>
+          <a:lstStyle/>
+          <a:p>
+            <a:r>
+              <a:rPr lang="en-US" altLang="zh-TW" sz="800" b="1" dirty="0">
+                <a:solidFill>
+                  <a:schemeClr val="accent4">
+                    <a:lumMod val="50000"/>
+                  </a:schemeClr>
+                </a:solidFill>
+              </a:rPr>
+              <a:t>Signal</a:t>
+            </a:r>
+            <a:endParaRPr lang="zh-TW" altLang="en-US" sz="800" b="1" dirty="0">
+              <a:solidFill>
+                <a:schemeClr val="accent4">
+                  <a:lumMod val="50000"/>
+                </a:schemeClr>
+              </a:solidFill>
+            </a:endParaRPr>
+          </a:p>
+        </p:txBody>
+      </p:sp>
     </p:spTree>
     <p:extLst>
       <p:ext uri="{BB962C8B-B14F-4D97-AF65-F5344CB8AC3E}">

</xml_diff>